<commit_message>
added revisions to presentation and report days late
</commit_message>
<xml_diff>
--- a/module_12/team_indigo-module_12_2-presentation.pptx
+++ b/module_12/team_indigo-module_12_2-presentation.pptx
@@ -5,10 +5,10 @@
     <p:sldMasterId id="2147483648" r:id="rId4"/>
   </p:sldMasterIdLst>
   <p:notesMasterIdLst>
-    <p:notesMasterId r:id="rId20"/>
+    <p:notesMasterId r:id="rId21"/>
   </p:notesMasterIdLst>
   <p:handoutMasterIdLst>
-    <p:handoutMasterId r:id="rId21"/>
+    <p:handoutMasterId r:id="rId22"/>
   </p:handoutMasterIdLst>
   <p:sldIdLst>
     <p:sldId id="256" r:id="rId5"/>
@@ -18,14 +18,15 @@
     <p:sldId id="269" r:id="rId9"/>
     <p:sldId id="276" r:id="rId10"/>
     <p:sldId id="265" r:id="rId11"/>
-    <p:sldId id="263" r:id="rId12"/>
-    <p:sldId id="272" r:id="rId13"/>
-    <p:sldId id="273" r:id="rId14"/>
+    <p:sldId id="272" r:id="rId12"/>
+    <p:sldId id="273" r:id="rId13"/>
+    <p:sldId id="263" r:id="rId14"/>
     <p:sldId id="264" r:id="rId15"/>
     <p:sldId id="274" r:id="rId16"/>
-    <p:sldId id="260" r:id="rId17"/>
-    <p:sldId id="275" r:id="rId18"/>
-    <p:sldId id="271" r:id="rId19"/>
+    <p:sldId id="277" r:id="rId17"/>
+    <p:sldId id="260" r:id="rId18"/>
+    <p:sldId id="275" r:id="rId19"/>
+    <p:sldId id="271" r:id="rId20"/>
   </p:sldIdLst>
   <p:sldSz cx="12192000" cy="6858000"/>
   <p:notesSz cx="6858000" cy="9144000"/>
@@ -138,13 +139,39 @@
 <file path=ppt/revisionInfo.xml><?xml version="1.0" encoding="utf-8"?>
 <p1510:revInfo xmlns:a="http://schemas.openxmlformats.org/drawingml/2006/main" xmlns:r="http://schemas.openxmlformats.org/officeDocument/2006/relationships" xmlns:p1510="http://schemas.microsoft.com/office/powerpoint/2015/10/main">
   <p1510:revLst>
-    <p1510:client id="{06F732B2-2C33-708A-4891-6E9EA11378DF}" v="6" dt="2022-12-09T21:17:21.311"/>
-    <p1510:client id="{29F5A172-A4B0-AFC5-5371-3C11FFBD9F59}" v="17" dt="2022-12-09T04:10:23.627"/>
-    <p1510:client id="{453E6AA1-7650-8672-5D27-5CC9DFBD1297}" v="489" dt="2022-12-15T22:57:46.146"/>
-    <p1510:client id="{55DE4078-DFF8-1B1E-B5AE-8294A128FA5C}" v="10" dt="2022-12-09T15:47:49.558"/>
-    <p1510:client id="{7B9B0D22-8FEA-432D-89BA-2D23AD27C0F8}" v="2279" dt="2022-12-09T02:04:20.802"/>
+    <p1510:client id="{1F596CF7-4DF6-479A-A563-B0F521B9C8A2}" v="15" dt="2022-12-16T22:22:57.271"/>
+    <p1510:client id="{9CA1E894-FC1D-3C65-A3CE-FB79D0BE6E43}" v="177" dt="2022-12-16T22:59:04.683"/>
   </p1510:revLst>
 </p1510:revInfo>
+</file>
+
+<file path=ppt/changesInfos/changesInfo1.xml><?xml version="1.0" encoding="utf-8"?>
+<pc:chgInfo xmlns:a="http://schemas.openxmlformats.org/drawingml/2006/main" xmlns:r="http://schemas.openxmlformats.org/officeDocument/2006/relationships" xmlns:ac="http://schemas.microsoft.com/office/drawing/2013/main/command" xmlns:pc="http://schemas.microsoft.com/office/powerpoint/2013/main/command">
+  <pc:docChgLst>
+    <pc:chgData name="jeff pedersen" userId="378fe4c31a44d53d" providerId="LiveId" clId="{F4B31AC7-8869-4BFB-B02F-23841096C49F}"/>
+    <pc:docChg chg="modSld">
+      <pc:chgData name="jeff pedersen" userId="378fe4c31a44d53d" providerId="LiveId" clId="{F4B31AC7-8869-4BFB-B02F-23841096C49F}" dt="2022-12-17T02:22:08.292" v="7" actId="20577"/>
+      <pc:docMkLst>
+        <pc:docMk/>
+      </pc:docMkLst>
+      <pc:sldChg chg="modSp mod">
+        <pc:chgData name="jeff pedersen" userId="378fe4c31a44d53d" providerId="LiveId" clId="{F4B31AC7-8869-4BFB-B02F-23841096C49F}" dt="2022-12-17T02:22:08.292" v="7" actId="20577"/>
+        <pc:sldMkLst>
+          <pc:docMk/>
+          <pc:sldMk cId="2619301236" sldId="264"/>
+        </pc:sldMkLst>
+        <pc:spChg chg="mod">
+          <ac:chgData name="jeff pedersen" userId="378fe4c31a44d53d" providerId="LiveId" clId="{F4B31AC7-8869-4BFB-B02F-23841096C49F}" dt="2022-12-17T02:22:08.292" v="7" actId="20577"/>
+          <ac:spMkLst>
+            <pc:docMk/>
+            <pc:sldMk cId="2619301236" sldId="264"/>
+            <ac:spMk id="41" creationId="{535EFC70-7489-8F2A-ED3D-23F60DD6E536}"/>
+          </ac:spMkLst>
+        </pc:spChg>
+      </pc:sldChg>
+    </pc:docChg>
+  </pc:docChgLst>
+</pc:chgInfo>
 </file>
 
 <file path=ppt/handoutMasters/handoutMaster1.xml><?xml version="1.0" encoding="utf-8"?>
@@ -9582,26 +9609,20 @@
         </p:nvSpPr>
         <p:spPr>
           <a:xfrm>
-            <a:off x="8255897" y="2559782"/>
-            <a:ext cx="3971985" cy="657637"/>
-          </a:xfrm>
-        </p:spPr>
-        <p:txBody>
-          <a:bodyPr/>
+            <a:off x="8895600" y="2926671"/>
+            <a:ext cx="3257023" cy="789341"/>
+          </a:xfrm>
+        </p:spPr>
+        <p:txBody>
+          <a:bodyPr>
+            <a:normAutofit fontScale="90000"/>
+          </a:bodyPr>
           <a:lstStyle/>
           <a:p>
             <a:pPr algn="r"/>
             <a:r>
               <a:rPr lang="en-US"/>
-              <a:t>Wine</a:t>
-            </a:r>
-            <a:r>
-              <a:rPr lang="en-US" dirty="0"/>
-              <a:t> Sales </a:t>
-            </a:r>
-            <a:r>
-              <a:rPr lang="en-US"/>
-              <a:t>Report</a:t>
+              <a:t>Distributor Sales Report</a:t>
             </a:r>
             <a:endParaRPr lang="en-US" dirty="0"/>
           </a:p>
@@ -9644,10 +9665,10 @@
       </p:sp>
       <p:pic>
         <p:nvPicPr>
-          <p:cNvPr id="4" name="Picture 4" descr="Text&#10;&#10;Description automatically generated">
-            <a:extLst>
-              <a:ext uri="{FF2B5EF4-FFF2-40B4-BE49-F238E27FC236}">
-                <a16:creationId xmlns:a16="http://schemas.microsoft.com/office/drawing/2014/main" id="{31510A8E-8098-287F-C4BA-A26A060D519F}"/>
+          <p:cNvPr id="3" name="Picture 4" descr="Text&#10;&#10;Description automatically generated">
+            <a:extLst>
+              <a:ext uri="{FF2B5EF4-FFF2-40B4-BE49-F238E27FC236}">
+                <a16:creationId xmlns:a16="http://schemas.microsoft.com/office/drawing/2014/main" id="{A2F74CAF-0159-D007-49C9-9A0B6F205ACF}"/>
               </a:ext>
             </a:extLst>
           </p:cNvPr>
@@ -9664,8 +9685,8 @@
         </p:blipFill>
         <p:spPr>
           <a:xfrm>
-            <a:off x="1318919" y="790644"/>
-            <a:ext cx="6778977" cy="5276713"/>
+            <a:off x="1093141" y="130677"/>
+            <a:ext cx="7794976" cy="6596643"/>
           </a:xfrm>
           <a:prstGeom prst="rect">
             <a:avLst/>
@@ -9675,7 +9696,7 @@
     </p:spTree>
     <p:extLst>
       <p:ext uri="{BB962C8B-B14F-4D97-AF65-F5344CB8AC3E}">
-        <p14:creationId xmlns:p14="http://schemas.microsoft.com/office/powerpoint/2010/main" val="228651240"/>
+        <p14:creationId xmlns:p14="http://schemas.microsoft.com/office/powerpoint/2010/main" val="4055079983"/>
       </p:ext>
     </p:extLst>
   </p:cSld>
@@ -9786,7 +9807,7 @@
         <p:spPr>
           <a:xfrm>
             <a:off x="1771878" y="1794774"/>
-            <a:ext cx="8620698" cy="2616101"/>
+            <a:ext cx="8620698" cy="4001095"/>
           </a:xfrm>
           <a:prstGeom prst="rect">
             <a:avLst/>
@@ -9804,7 +9825,7 @@
           <a:p>
             <a:r>
               <a:rPr lang="en-US" dirty="0"/>
-              <a:t>Our next report was created to provide a solution for the following two questions: </a:t>
+              <a:t>Our next two reports were created to provide a solution for the following two questions: </a:t>
             </a:r>
           </a:p>
           <a:p>
@@ -9842,7 +9863,7 @@
               </a:rPr>
               <a:t>Is there a large gap between expected delivery and actual delivery? </a:t>
             </a:r>
-            <a:endParaRPr lang="en-US">
+            <a:endParaRPr lang="en-US" dirty="0">
               <a:ea typeface="+mn-lt"/>
               <a:cs typeface="+mn-lt"/>
             </a:endParaRPr>
@@ -9857,6 +9878,16 @@
             <a:r>
               <a:rPr lang="en-US" dirty="0"/>
               <a:t>Our report titled, "Delivery_Arrival_Report.py", is written with the purpose of tracking inbound deliveries by month to ensure they are being delivered on time by comparing their expected delivery date to their actual delivery date. </a:t>
+            </a:r>
+            <a:br>
+              <a:rPr lang="en-US" dirty="0"/>
+            </a:br>
+            <a:br>
+              <a:rPr lang="en-US" dirty="0"/>
+            </a:br>
+            <a:r>
+              <a:rPr lang="en-US" dirty="0"/>
+              <a:t>Our report titled "Supplier_days_late.py" is written to track how many days each supplier was late vs their number of orders. This helps answer the first question to show which suppliers are arriving later than anticipated more frequently.</a:t>
             </a:r>
           </a:p>
         </p:txBody>
@@ -10025,7 +10056,7 @@
           <p:cNvPr id="2" name="Title 1">
             <a:extLst>
               <a:ext uri="{FF2B5EF4-FFF2-40B4-BE49-F238E27FC236}">
-                <a16:creationId xmlns:a16="http://schemas.microsoft.com/office/drawing/2014/main" id="{09140014-73D5-419B-8867-972BB18D52D4}"/>
+                <a16:creationId xmlns:a16="http://schemas.microsoft.com/office/drawing/2014/main" id="{42DD0E59-4C68-4F87-9821-23C69713D980}"/>
               </a:ext>
             </a:extLst>
           </p:cNvPr>
@@ -10038,67 +10069,29 @@
         </p:nvSpPr>
         <p:spPr>
           <a:xfrm>
-            <a:off x="7404711" y="203624"/>
-            <a:ext cx="4749400" cy="526840"/>
+            <a:off x="459333" y="3136736"/>
+            <a:ext cx="3298846" cy="820624"/>
           </a:xfrm>
         </p:spPr>
         <p:txBody>
           <a:bodyPr/>
           <a:lstStyle/>
           <a:p>
-            <a:pPr algn="r"/>
-            <a:r>
-              <a:rPr lang="en-US">
-                <a:ea typeface="+mj-lt"/>
-                <a:cs typeface="+mj-lt"/>
-              </a:rPr>
-              <a:t>EMPLOYEE HOURS REPORT</a:t>
-            </a:r>
-          </a:p>
-          <a:p>
+            <a:pPr algn="l"/>
+            <a:r>
+              <a:rPr lang="en-US"/>
+              <a:t>Supplier Report</a:t>
+            </a:r>
             <a:endParaRPr lang="en-US" dirty="0"/>
           </a:p>
         </p:txBody>
       </p:sp>
       <p:sp>
         <p:nvSpPr>
-          <p:cNvPr id="8" name="Footer Placeholder 7">
-            <a:extLst>
-              <a:ext uri="{FF2B5EF4-FFF2-40B4-BE49-F238E27FC236}">
-                <a16:creationId xmlns:a16="http://schemas.microsoft.com/office/drawing/2014/main" id="{905F172A-5D5D-43CD-A187-DA0D303F4144}"/>
-              </a:ext>
-            </a:extLst>
-          </p:cNvPr>
-          <p:cNvSpPr>
-            <a:spLocks noGrp="1"/>
-          </p:cNvSpPr>
-          <p:nvPr>
-            <p:ph type="ftr" sz="quarter" idx="11"/>
-          </p:nvPr>
-        </p:nvSpPr>
-        <p:spPr>
-          <a:xfrm>
-            <a:off x="4038600" y="6356350"/>
-            <a:ext cx="4114800" cy="365125"/>
-          </a:xfrm>
-        </p:spPr>
-        <p:txBody>
-          <a:bodyPr/>
-          <a:lstStyle/>
-          <a:p>
-            <a:r>
-              <a:rPr lang="en-US" dirty="0"/>
-              <a:t>PRESENTATION TITLE</a:t>
-            </a:r>
-          </a:p>
-        </p:txBody>
-      </p:sp>
-      <p:sp>
-        <p:nvSpPr>
-          <p:cNvPr id="9" name="Slide Number Placeholder 8">
-            <a:extLst>
-              <a:ext uri="{FF2B5EF4-FFF2-40B4-BE49-F238E27FC236}">
-                <a16:creationId xmlns:a16="http://schemas.microsoft.com/office/drawing/2014/main" id="{C396FFDC-ADE8-4009-A466-A81787258E88}"/>
+          <p:cNvPr id="58" name="Slide Number Placeholder 57">
+            <a:extLst>
+              <a:ext uri="{FF2B5EF4-FFF2-40B4-BE49-F238E27FC236}">
+                <a16:creationId xmlns:a16="http://schemas.microsoft.com/office/drawing/2014/main" id="{E1900601-8B04-4FF3-B06F-6BEFAC6556D3}"/>
               </a:ext>
             </a:extLst>
           </p:cNvPr>
@@ -10128,91 +10121,40 @@
           </a:p>
         </p:txBody>
       </p:sp>
-      <p:sp>
-        <p:nvSpPr>
-          <p:cNvPr id="15" name="TextBox 14">
-            <a:extLst>
-              <a:ext uri="{FF2B5EF4-FFF2-40B4-BE49-F238E27FC236}">
-                <a16:creationId xmlns:a16="http://schemas.microsoft.com/office/drawing/2014/main" id="{54794D5E-E32A-90BC-A535-B6AEFCCF2638}"/>
-              </a:ext>
-            </a:extLst>
-          </p:cNvPr>
-          <p:cNvSpPr txBox="1"/>
+      <p:pic>
+        <p:nvPicPr>
+          <p:cNvPr id="3" name="Picture 4" descr="Text&#10;&#10;Description automatically generated">
+            <a:extLst>
+              <a:ext uri="{FF2B5EF4-FFF2-40B4-BE49-F238E27FC236}">
+                <a16:creationId xmlns:a16="http://schemas.microsoft.com/office/drawing/2014/main" id="{DBE4316E-3F4C-F1DA-209D-3369368D7510}"/>
+              </a:ext>
+            </a:extLst>
+          </p:cNvPr>
+          <p:cNvPicPr>
+            <a:picLocks noChangeAspect="1"/>
+          </p:cNvPicPr>
           <p:nvPr/>
-        </p:nvSpPr>
-        <p:spPr>
-          <a:xfrm>
-            <a:off x="3279330" y="1709994"/>
-            <a:ext cx="6288795" cy="2954655"/>
+        </p:nvPicPr>
+        <p:blipFill>
+          <a:blip r:embed="rId2"/>
+          <a:stretch>
+            <a:fillRect/>
+          </a:stretch>
+        </p:blipFill>
+        <p:spPr>
+          <a:xfrm>
+            <a:off x="4718103" y="1126118"/>
+            <a:ext cx="5835282" cy="4725418"/>
           </a:xfrm>
           <a:prstGeom prst="rect">
             <a:avLst/>
           </a:prstGeom>
-          <a:noFill/>
-        </p:spPr>
-        <p:txBody>
-          <a:bodyPr rot="0" spcFirstLastPara="0" vertOverflow="overflow" horzOverflow="overflow" vert="horz" wrap="square" lIns="91440" tIns="45720" rIns="91440" bIns="45720" numCol="1" spcCol="0" rtlCol="0" fromWordArt="0" anchor="t" anchorCtr="0" forceAA="0" compatLnSpc="1">
-            <a:prstTxWarp prst="textNoShape">
-              <a:avLst/>
-            </a:prstTxWarp>
-            <a:spAutoFit/>
-          </a:bodyPr>
-          <a:lstStyle/>
-          <a:p>
-            <a:r>
-              <a:rPr lang="en-US" dirty="0"/>
-              <a:t>Our final report was created to provide a solution to the following question:</a:t>
-            </a:r>
-            <a:endParaRPr lang="en-US" sz="1400" dirty="0">
-              <a:ea typeface="+mn-lt"/>
-              <a:cs typeface="+mn-lt"/>
-            </a:endParaRPr>
-          </a:p>
-          <a:p>
-            <a:endParaRPr lang="en-US" dirty="0">
-              <a:ea typeface="+mn-lt"/>
-              <a:cs typeface="+mn-lt"/>
-            </a:endParaRPr>
-          </a:p>
-          <a:p>
-            <a:endParaRPr lang="en-US" dirty="0">
-              <a:ea typeface="+mn-lt"/>
-              <a:cs typeface="+mn-lt"/>
-            </a:endParaRPr>
-          </a:p>
-          <a:p>
-            <a:pPr marL="342900" indent="-342900">
-              <a:buAutoNum type="arabicPeriod"/>
-            </a:pPr>
-            <a:r>
-              <a:rPr lang="en-US" sz="1400" dirty="0">
-                <a:ea typeface="+mn-lt"/>
-                <a:cs typeface="+mn-lt"/>
-              </a:rPr>
-              <a:t>During the last four quarters, how many hours did each employee work?</a:t>
-            </a:r>
-          </a:p>
-          <a:p>
-            <a:pPr marL="342900" indent="-342900">
-              <a:buAutoNum type="arabicPeriod"/>
-            </a:pPr>
-            <a:endParaRPr lang="en-US" sz="1400" dirty="0"/>
-          </a:p>
-          <a:p>
-            <a:endParaRPr lang="en-US" sz="1400" dirty="0"/>
-          </a:p>
-          <a:p>
-            <a:r>
-              <a:rPr lang="en-US" dirty="0"/>
-              <a:t>Our report titled, "Bacchus_Winery_Hours_Report.py", is written with the purpose of showing a workers hours broken down by the current week as well as the current hours worked, year to date. </a:t>
-            </a:r>
-          </a:p>
-        </p:txBody>
-      </p:sp>
+        </p:spPr>
+      </p:pic>
     </p:spTree>
     <p:extLst>
       <p:ext uri="{BB962C8B-B14F-4D97-AF65-F5344CB8AC3E}">
-        <p14:creationId xmlns:p14="http://schemas.microsoft.com/office/powerpoint/2010/main" val="1663780162"/>
+        <p14:creationId xmlns:p14="http://schemas.microsoft.com/office/powerpoint/2010/main" val="3082876863"/>
       </p:ext>
     </p:extLst>
   </p:cSld>
@@ -10244,7 +10186,7 @@
           <p:cNvPr id="2" name="Title 1">
             <a:extLst>
               <a:ext uri="{FF2B5EF4-FFF2-40B4-BE49-F238E27FC236}">
-                <a16:creationId xmlns:a16="http://schemas.microsoft.com/office/drawing/2014/main" id="{42DD0E59-4C68-4F87-9821-23C69713D980}"/>
+                <a16:creationId xmlns:a16="http://schemas.microsoft.com/office/drawing/2014/main" id="{09140014-73D5-419B-8867-972BB18D52D4}"/>
               </a:ext>
             </a:extLst>
           </p:cNvPr>
@@ -10257,30 +10199,67 @@
         </p:nvSpPr>
         <p:spPr>
           <a:xfrm>
-            <a:off x="9259769" y="3143041"/>
-            <a:ext cx="2983981" cy="431860"/>
-          </a:xfrm>
-        </p:spPr>
-        <p:txBody>
-          <a:bodyPr>
-            <a:normAutofit fontScale="90000"/>
-          </a:bodyPr>
+            <a:off x="7404711" y="203624"/>
+            <a:ext cx="4749400" cy="526840"/>
+          </a:xfrm>
+        </p:spPr>
+        <p:txBody>
+          <a:bodyPr/>
           <a:lstStyle/>
           <a:p>
+            <a:pPr algn="r"/>
+            <a:r>
+              <a:rPr lang="en-US">
+                <a:ea typeface="+mj-lt"/>
+                <a:cs typeface="+mj-lt"/>
+              </a:rPr>
+              <a:t>EMPLOYEE HOURS REPORT</a:t>
+            </a:r>
+          </a:p>
+          <a:p>
+            <a:endParaRPr lang="en-US" dirty="0"/>
+          </a:p>
+        </p:txBody>
+      </p:sp>
+      <p:sp>
+        <p:nvSpPr>
+          <p:cNvPr id="8" name="Footer Placeholder 7">
+            <a:extLst>
+              <a:ext uri="{FF2B5EF4-FFF2-40B4-BE49-F238E27FC236}">
+                <a16:creationId xmlns:a16="http://schemas.microsoft.com/office/drawing/2014/main" id="{905F172A-5D5D-43CD-A187-DA0D303F4144}"/>
+              </a:ext>
+            </a:extLst>
+          </p:cNvPr>
+          <p:cNvSpPr>
+            <a:spLocks noGrp="1"/>
+          </p:cNvSpPr>
+          <p:nvPr>
+            <p:ph type="ftr" sz="quarter" idx="11"/>
+          </p:nvPr>
+        </p:nvSpPr>
+        <p:spPr>
+          <a:xfrm>
+            <a:off x="4038600" y="6356350"/>
+            <a:ext cx="4114800" cy="365125"/>
+          </a:xfrm>
+        </p:spPr>
+        <p:txBody>
+          <a:bodyPr/>
+          <a:lstStyle/>
+          <a:p>
             <a:r>
               <a:rPr lang="en-US" dirty="0"/>
-              <a:t>Employee Hours Report</a:t>
-            </a:r>
-            <a:endParaRPr lang="en-US"/>
-          </a:p>
-        </p:txBody>
-      </p:sp>
-      <p:sp>
-        <p:nvSpPr>
-          <p:cNvPr id="58" name="Slide Number Placeholder 57">
-            <a:extLst>
-              <a:ext uri="{FF2B5EF4-FFF2-40B4-BE49-F238E27FC236}">
-                <a16:creationId xmlns:a16="http://schemas.microsoft.com/office/drawing/2014/main" id="{E1900601-8B04-4FF3-B06F-6BEFAC6556D3}"/>
+              <a:t>PRESENTATION TITLE</a:t>
+            </a:r>
+          </a:p>
+        </p:txBody>
+      </p:sp>
+      <p:sp>
+        <p:nvSpPr>
+          <p:cNvPr id="9" name="Slide Number Placeholder 8">
+            <a:extLst>
+              <a:ext uri="{FF2B5EF4-FFF2-40B4-BE49-F238E27FC236}">
+                <a16:creationId xmlns:a16="http://schemas.microsoft.com/office/drawing/2014/main" id="{C396FFDC-ADE8-4009-A466-A81787258E88}"/>
               </a:ext>
             </a:extLst>
           </p:cNvPr>
@@ -10310,40 +10289,91 @@
           </a:p>
         </p:txBody>
       </p:sp>
-      <p:pic>
-        <p:nvPicPr>
-          <p:cNvPr id="4" name="Picture 4" descr="A picture containing table&#10;&#10;Description automatically generated">
-            <a:extLst>
-              <a:ext uri="{FF2B5EF4-FFF2-40B4-BE49-F238E27FC236}">
-                <a16:creationId xmlns:a16="http://schemas.microsoft.com/office/drawing/2014/main" id="{C976B841-A2D7-A9FA-E0D6-1327ABBF801E}"/>
-              </a:ext>
-            </a:extLst>
-          </p:cNvPr>
-          <p:cNvPicPr>
-            <a:picLocks noChangeAspect="1"/>
-          </p:cNvPicPr>
+      <p:sp>
+        <p:nvSpPr>
+          <p:cNvPr id="15" name="TextBox 14">
+            <a:extLst>
+              <a:ext uri="{FF2B5EF4-FFF2-40B4-BE49-F238E27FC236}">
+                <a16:creationId xmlns:a16="http://schemas.microsoft.com/office/drawing/2014/main" id="{54794D5E-E32A-90BC-A535-B6AEFCCF2638}"/>
+              </a:ext>
+            </a:extLst>
+          </p:cNvPr>
+          <p:cNvSpPr txBox="1"/>
           <p:nvPr/>
-        </p:nvPicPr>
-        <p:blipFill>
-          <a:blip r:embed="rId2"/>
-          <a:stretch>
-            <a:fillRect/>
-          </a:stretch>
-        </p:blipFill>
-        <p:spPr>
-          <a:xfrm>
-            <a:off x="2015066" y="67221"/>
-            <a:ext cx="5339643" cy="6742370"/>
+        </p:nvSpPr>
+        <p:spPr>
+          <a:xfrm>
+            <a:off x="3279330" y="1709994"/>
+            <a:ext cx="6288795" cy="2954655"/>
           </a:xfrm>
           <a:prstGeom prst="rect">
             <a:avLst/>
           </a:prstGeom>
-        </p:spPr>
-      </p:pic>
+          <a:noFill/>
+        </p:spPr>
+        <p:txBody>
+          <a:bodyPr rot="0" spcFirstLastPara="0" vertOverflow="overflow" horzOverflow="overflow" vert="horz" wrap="square" lIns="91440" tIns="45720" rIns="91440" bIns="45720" numCol="1" spcCol="0" rtlCol="0" fromWordArt="0" anchor="t" anchorCtr="0" forceAA="0" compatLnSpc="1">
+            <a:prstTxWarp prst="textNoShape">
+              <a:avLst/>
+            </a:prstTxWarp>
+            <a:spAutoFit/>
+          </a:bodyPr>
+          <a:lstStyle/>
+          <a:p>
+            <a:r>
+              <a:rPr lang="en-US" dirty="0"/>
+              <a:t>Our final report was created to provide a solution to the following question:</a:t>
+            </a:r>
+            <a:endParaRPr lang="en-US" sz="1400" dirty="0">
+              <a:ea typeface="+mn-lt"/>
+              <a:cs typeface="+mn-lt"/>
+            </a:endParaRPr>
+          </a:p>
+          <a:p>
+            <a:endParaRPr lang="en-US" dirty="0">
+              <a:ea typeface="+mn-lt"/>
+              <a:cs typeface="+mn-lt"/>
+            </a:endParaRPr>
+          </a:p>
+          <a:p>
+            <a:endParaRPr lang="en-US" dirty="0">
+              <a:ea typeface="+mn-lt"/>
+              <a:cs typeface="+mn-lt"/>
+            </a:endParaRPr>
+          </a:p>
+          <a:p>
+            <a:pPr marL="342900" indent="-342900">
+              <a:buAutoNum type="arabicPeriod"/>
+            </a:pPr>
+            <a:r>
+              <a:rPr lang="en-US" sz="1400" dirty="0">
+                <a:ea typeface="+mn-lt"/>
+                <a:cs typeface="+mn-lt"/>
+              </a:rPr>
+              <a:t>During the last four quarters, how many hours did each employee work?</a:t>
+            </a:r>
+          </a:p>
+          <a:p>
+            <a:pPr marL="342900" indent="-342900">
+              <a:buAutoNum type="arabicPeriod"/>
+            </a:pPr>
+            <a:endParaRPr lang="en-US" sz="1400" dirty="0"/>
+          </a:p>
+          <a:p>
+            <a:endParaRPr lang="en-US" sz="1400" dirty="0"/>
+          </a:p>
+          <a:p>
+            <a:r>
+              <a:rPr lang="en-US" dirty="0"/>
+              <a:t>Our report titled, "Bacchus_Winery_Hours_Report.py", is written with the purpose of showing a workers hours broken down by the current week as well as the current hours worked, year to date. </a:t>
+            </a:r>
+          </a:p>
+        </p:txBody>
+      </p:sp>
     </p:spTree>
     <p:extLst>
       <p:ext uri="{BB962C8B-B14F-4D97-AF65-F5344CB8AC3E}">
-        <p14:creationId xmlns:p14="http://schemas.microsoft.com/office/powerpoint/2010/main" val="2627638362"/>
+        <p14:creationId xmlns:p14="http://schemas.microsoft.com/office/powerpoint/2010/main" val="1663780162"/>
       </p:ext>
     </p:extLst>
   </p:cSld>
@@ -10375,40 +10405,43 @@
           <p:cNvPr id="2" name="Title 1">
             <a:extLst>
               <a:ext uri="{FF2B5EF4-FFF2-40B4-BE49-F238E27FC236}">
-                <a16:creationId xmlns:a16="http://schemas.microsoft.com/office/drawing/2014/main" id="{8BDF1EDE-5423-435C-B149-87AB1BC22B83}"/>
-              </a:ext>
-            </a:extLst>
-          </p:cNvPr>
-          <p:cNvSpPr>
-            <a:spLocks noGrp="1"/>
-          </p:cNvSpPr>
-          <p:nvPr>
-            <p:ph type="ctrTitle"/>
-          </p:nvPr>
-        </p:nvSpPr>
-        <p:spPr>
-          <a:xfrm>
-            <a:off x="4827224" y="2148218"/>
-            <a:ext cx="4179570" cy="1524735"/>
-          </a:xfrm>
-        </p:spPr>
-        <p:txBody>
-          <a:bodyPr/>
+                <a16:creationId xmlns:a16="http://schemas.microsoft.com/office/drawing/2014/main" id="{42DD0E59-4C68-4F87-9821-23C69713D980}"/>
+              </a:ext>
+            </a:extLst>
+          </p:cNvPr>
+          <p:cNvSpPr>
+            <a:spLocks noGrp="1"/>
+          </p:cNvSpPr>
+          <p:nvPr>
+            <p:ph type="title"/>
+          </p:nvPr>
+        </p:nvSpPr>
+        <p:spPr>
+          <a:xfrm>
+            <a:off x="9259769" y="3143041"/>
+            <a:ext cx="2983981" cy="431860"/>
+          </a:xfrm>
+        </p:spPr>
+        <p:txBody>
+          <a:bodyPr>
+            <a:normAutofit fontScale="90000"/>
+          </a:bodyPr>
           <a:lstStyle/>
           <a:p>
             <a:r>
               <a:rPr lang="en-US" dirty="0"/>
-              <a:t>THANK YOU</a:t>
-            </a:r>
-          </a:p>
-        </p:txBody>
-      </p:sp>
-      <p:sp>
-        <p:nvSpPr>
-          <p:cNvPr id="6" name="Slide Number Placeholder 5">
-            <a:extLst>
-              <a:ext uri="{FF2B5EF4-FFF2-40B4-BE49-F238E27FC236}">
-                <a16:creationId xmlns:a16="http://schemas.microsoft.com/office/drawing/2014/main" id="{4C127D99-645F-4FCF-9573-FDFE2A344FA9}"/>
+              <a:t>Employee Hours Report</a:t>
+            </a:r>
+            <a:endParaRPr lang="en-US"/>
+          </a:p>
+        </p:txBody>
+      </p:sp>
+      <p:sp>
+        <p:nvSpPr>
+          <p:cNvPr id="58" name="Slide Number Placeholder 57">
+            <a:extLst>
+              <a:ext uri="{FF2B5EF4-FFF2-40B4-BE49-F238E27FC236}">
+                <a16:creationId xmlns:a16="http://schemas.microsoft.com/office/drawing/2014/main" id="{E1900601-8B04-4FF3-B06F-6BEFAC6556D3}"/>
               </a:ext>
             </a:extLst>
           </p:cNvPr>
@@ -10421,8 +10454,8 @@
         </p:nvSpPr>
         <p:spPr>
           <a:xfrm>
-            <a:off x="9579428" y="6356350"/>
-            <a:ext cx="1774371" cy="365125"/>
+            <a:off x="8610600" y="6356350"/>
+            <a:ext cx="2743200" cy="365125"/>
           </a:xfrm>
         </p:spPr>
         <p:txBody>
@@ -10433,6 +10466,134 @@
               <a:rPr lang="en-US" smtClean="0"/>
               <a:pPr/>
               <a:t>15</a:t>
+            </a:fld>
+            <a:endParaRPr lang="en-US" dirty="0"/>
+          </a:p>
+        </p:txBody>
+      </p:sp>
+      <p:pic>
+        <p:nvPicPr>
+          <p:cNvPr id="4" name="Picture 4" descr="A picture containing table&#10;&#10;Description automatically generated">
+            <a:extLst>
+              <a:ext uri="{FF2B5EF4-FFF2-40B4-BE49-F238E27FC236}">
+                <a16:creationId xmlns:a16="http://schemas.microsoft.com/office/drawing/2014/main" id="{C976B841-A2D7-A9FA-E0D6-1327ABBF801E}"/>
+              </a:ext>
+            </a:extLst>
+          </p:cNvPr>
+          <p:cNvPicPr>
+            <a:picLocks noChangeAspect="1"/>
+          </p:cNvPicPr>
+          <p:nvPr/>
+        </p:nvPicPr>
+        <p:blipFill>
+          <a:blip r:embed="rId2"/>
+          <a:stretch>
+            <a:fillRect/>
+          </a:stretch>
+        </p:blipFill>
+        <p:spPr>
+          <a:xfrm>
+            <a:off x="2015066" y="67221"/>
+            <a:ext cx="5339643" cy="6742370"/>
+          </a:xfrm>
+          <a:prstGeom prst="rect">
+            <a:avLst/>
+          </a:prstGeom>
+        </p:spPr>
+      </p:pic>
+    </p:spTree>
+    <p:extLst>
+      <p:ext uri="{BB962C8B-B14F-4D97-AF65-F5344CB8AC3E}">
+        <p14:creationId xmlns:p14="http://schemas.microsoft.com/office/powerpoint/2010/main" val="2627638362"/>
+      </p:ext>
+    </p:extLst>
+  </p:cSld>
+  <p:clrMapOvr>
+    <a:masterClrMapping/>
+  </p:clrMapOvr>
+</p:sld>
+</file>
+
+<file path=ppt/slides/slide16.xml><?xml version="1.0" encoding="utf-8"?>
+<p:sld xmlns:a="http://schemas.openxmlformats.org/drawingml/2006/main" xmlns:r="http://schemas.openxmlformats.org/officeDocument/2006/relationships" xmlns:p="http://schemas.openxmlformats.org/presentationml/2006/main">
+  <p:cSld>
+    <p:spTree>
+      <p:nvGrpSpPr>
+        <p:cNvPr id="1" name=""/>
+        <p:cNvGrpSpPr/>
+        <p:nvPr/>
+      </p:nvGrpSpPr>
+      <p:grpSpPr>
+        <a:xfrm>
+          <a:off x="0" y="0"/>
+          <a:ext cx="0" cy="0"/>
+          <a:chOff x="0" y="0"/>
+          <a:chExt cx="0" cy="0"/>
+        </a:xfrm>
+      </p:grpSpPr>
+      <p:sp>
+        <p:nvSpPr>
+          <p:cNvPr id="2" name="Title 1">
+            <a:extLst>
+              <a:ext uri="{FF2B5EF4-FFF2-40B4-BE49-F238E27FC236}">
+                <a16:creationId xmlns:a16="http://schemas.microsoft.com/office/drawing/2014/main" id="{8BDF1EDE-5423-435C-B149-87AB1BC22B83}"/>
+              </a:ext>
+            </a:extLst>
+          </p:cNvPr>
+          <p:cNvSpPr>
+            <a:spLocks noGrp="1"/>
+          </p:cNvSpPr>
+          <p:nvPr>
+            <p:ph type="ctrTitle"/>
+          </p:nvPr>
+        </p:nvSpPr>
+        <p:spPr>
+          <a:xfrm>
+            <a:off x="4827224" y="2148218"/>
+            <a:ext cx="4179570" cy="1524735"/>
+          </a:xfrm>
+        </p:spPr>
+        <p:txBody>
+          <a:bodyPr/>
+          <a:lstStyle/>
+          <a:p>
+            <a:r>
+              <a:rPr lang="en-US" dirty="0"/>
+              <a:t>THANK YOU</a:t>
+            </a:r>
+          </a:p>
+        </p:txBody>
+      </p:sp>
+      <p:sp>
+        <p:nvSpPr>
+          <p:cNvPr id="6" name="Slide Number Placeholder 5">
+            <a:extLst>
+              <a:ext uri="{FF2B5EF4-FFF2-40B4-BE49-F238E27FC236}">
+                <a16:creationId xmlns:a16="http://schemas.microsoft.com/office/drawing/2014/main" id="{4C127D99-645F-4FCF-9573-FDFE2A344FA9}"/>
+              </a:ext>
+            </a:extLst>
+          </p:cNvPr>
+          <p:cNvSpPr>
+            <a:spLocks noGrp="1"/>
+          </p:cNvSpPr>
+          <p:nvPr>
+            <p:ph type="sldNum" sz="quarter" idx="12"/>
+          </p:nvPr>
+        </p:nvSpPr>
+        <p:spPr>
+          <a:xfrm>
+            <a:off x="9579428" y="6356350"/>
+            <a:ext cx="1774371" cy="365125"/>
+          </a:xfrm>
+        </p:spPr>
+        <p:txBody>
+          <a:bodyPr/>
+          <a:lstStyle/>
+          <a:p>
+            <a:fld id="{A49DFD55-3C28-40EF-9E31-A92D2E4017FF}" type="slidenum">
+              <a:rPr lang="en-US" smtClean="0"/>
+              <a:pPr/>
+              <a:t>16</a:t>
             </a:fld>
             <a:endParaRPr lang="en-US" dirty="0"/>
           </a:p>
@@ -11548,17 +11709,26 @@
         </p:nvSpPr>
         <p:spPr>
           <a:xfrm>
-            <a:off x="-82137" y="3175619"/>
+            <a:off x="-394752" y="2921619"/>
             <a:ext cx="2915393" cy="504187"/>
           </a:xfrm>
         </p:spPr>
         <p:txBody>
-          <a:bodyPr/>
+          <a:bodyPr vert="horz" lIns="91440" tIns="45720" rIns="91440" bIns="45720" rtlCol="0" anchor="ctr">
+            <a:noAutofit/>
+          </a:bodyPr>
           <a:lstStyle/>
           <a:p>
             <a:r>
-              <a:rPr lang="en-US"/>
-              <a:t>Finalized ERD</a:t>
+              <a:rPr lang="en-US" sz="2400" dirty="0"/>
+              <a:t>Finalized </a:t>
+            </a:r>
+            <a:br>
+              <a:rPr lang="en-US" sz="2400" dirty="0"/>
+            </a:br>
+            <a:r>
+              <a:rPr lang="en-US" sz="2400" dirty="0"/>
+              <a:t>ERD</a:t>
             </a:r>
           </a:p>
         </p:txBody>
@@ -11600,10 +11770,10 @@
       </p:sp>
       <p:pic>
         <p:nvPicPr>
-          <p:cNvPr id="4" name="Picture 4" descr="Table&#10;&#10;Description automatically generated">
-            <a:extLst>
-              <a:ext uri="{FF2B5EF4-FFF2-40B4-BE49-F238E27FC236}">
-                <a16:creationId xmlns:a16="http://schemas.microsoft.com/office/drawing/2014/main" id="{CCD60453-3E9D-755B-C1FC-D127299A73B6}"/>
+          <p:cNvPr id="2" name="Picture 4">
+            <a:extLst>
+              <a:ext uri="{FF2B5EF4-FFF2-40B4-BE49-F238E27FC236}">
+                <a16:creationId xmlns:a16="http://schemas.microsoft.com/office/drawing/2014/main" id="{C29A1371-1445-FDBC-4519-77EDA1208F13}"/>
               </a:ext>
             </a:extLst>
           </p:cNvPr>
@@ -11620,8 +11790,8 @@
         </p:blipFill>
         <p:spPr>
           <a:xfrm>
-            <a:off x="2696933" y="1567"/>
-            <a:ext cx="9496358" cy="6857133"/>
+            <a:off x="1393092" y="-327425"/>
+            <a:ext cx="11154506" cy="7219773"/>
           </a:xfrm>
           <a:prstGeom prst="rect">
             <a:avLst/>
@@ -11904,8 +12074,8 @@
         </p:nvSpPr>
         <p:spPr>
           <a:xfrm>
-            <a:off x="8895600" y="2926671"/>
-            <a:ext cx="3257023" cy="789341"/>
+            <a:off x="-154325" y="2954892"/>
+            <a:ext cx="3200577" cy="591786"/>
           </a:xfrm>
         </p:spPr>
         <p:txBody>
@@ -11914,12 +12084,10 @@
           </a:bodyPr>
           <a:lstStyle/>
           <a:p>
-            <a:pPr algn="r"/>
-            <a:r>
-              <a:rPr lang="en-US"/>
-              <a:t>Distributor Sales Report</a:t>
-            </a:r>
-            <a:endParaRPr lang="en-US" dirty="0"/>
+            <a:r>
+              <a:rPr lang="en-US" dirty="0"/>
+              <a:t>Monthly Sales Report</a:t>
+            </a:r>
           </a:p>
         </p:txBody>
       </p:sp>
@@ -11960,10 +12128,10 @@
       </p:sp>
       <p:pic>
         <p:nvPicPr>
-          <p:cNvPr id="3" name="Picture 4" descr="Text&#10;&#10;Description automatically generated">
-            <a:extLst>
-              <a:ext uri="{FF2B5EF4-FFF2-40B4-BE49-F238E27FC236}">
-                <a16:creationId xmlns:a16="http://schemas.microsoft.com/office/drawing/2014/main" id="{A2F74CAF-0159-D007-49C9-9A0B6F205ACF}"/>
+          <p:cNvPr id="4" name="Picture 4" descr="A picture containing text&#10;&#10;Description automatically generated">
+            <a:extLst>
+              <a:ext uri="{FF2B5EF4-FFF2-40B4-BE49-F238E27FC236}">
+                <a16:creationId xmlns:a16="http://schemas.microsoft.com/office/drawing/2014/main" id="{EDFB344E-AE18-DE57-880D-F73D514556DB}"/>
               </a:ext>
             </a:extLst>
           </p:cNvPr>
@@ -11980,8 +12148,8 @@
         </p:blipFill>
         <p:spPr>
           <a:xfrm>
-            <a:off x="1093141" y="130677"/>
-            <a:ext cx="7794976" cy="6596643"/>
+            <a:off x="2936992" y="592468"/>
+            <a:ext cx="9149642" cy="5673063"/>
           </a:xfrm>
           <a:prstGeom prst="rect">
             <a:avLst/>
@@ -11991,7 +12159,7 @@
     </p:spTree>
     <p:extLst>
       <p:ext uri="{BB962C8B-B14F-4D97-AF65-F5344CB8AC3E}">
-        <p14:creationId xmlns:p14="http://schemas.microsoft.com/office/powerpoint/2010/main" val="4055079983"/>
+        <p14:creationId xmlns:p14="http://schemas.microsoft.com/office/powerpoint/2010/main" val="2550109971"/>
       </p:ext>
     </p:extLst>
   </p:cSld>
@@ -12036,20 +12204,28 @@
         </p:nvSpPr>
         <p:spPr>
           <a:xfrm>
-            <a:off x="-154325" y="2954892"/>
-            <a:ext cx="3200577" cy="591786"/>
-          </a:xfrm>
-        </p:spPr>
-        <p:txBody>
-          <a:bodyPr>
-            <a:normAutofit fontScale="90000"/>
-          </a:bodyPr>
+            <a:off x="8255897" y="2559782"/>
+            <a:ext cx="3971985" cy="657637"/>
+          </a:xfrm>
+        </p:spPr>
+        <p:txBody>
+          <a:bodyPr/>
           <a:lstStyle/>
           <a:p>
+            <a:pPr algn="r"/>
+            <a:r>
+              <a:rPr lang="en-US"/>
+              <a:t>Wine</a:t>
+            </a:r>
             <a:r>
               <a:rPr lang="en-US" dirty="0"/>
-              <a:t>Monthly Sales Report</a:t>
-            </a:r>
+              <a:t> Sales </a:t>
+            </a:r>
+            <a:r>
+              <a:rPr lang="en-US"/>
+              <a:t>Report</a:t>
+            </a:r>
+            <a:endParaRPr lang="en-US" dirty="0"/>
           </a:p>
         </p:txBody>
       </p:sp>
@@ -12090,10 +12266,10 @@
       </p:sp>
       <p:pic>
         <p:nvPicPr>
-          <p:cNvPr id="4" name="Picture 4" descr="A picture containing text&#10;&#10;Description automatically generated">
-            <a:extLst>
-              <a:ext uri="{FF2B5EF4-FFF2-40B4-BE49-F238E27FC236}">
-                <a16:creationId xmlns:a16="http://schemas.microsoft.com/office/drawing/2014/main" id="{EDFB344E-AE18-DE57-880D-F73D514556DB}"/>
+          <p:cNvPr id="4" name="Picture 4" descr="Text&#10;&#10;Description automatically generated">
+            <a:extLst>
+              <a:ext uri="{FF2B5EF4-FFF2-40B4-BE49-F238E27FC236}">
+                <a16:creationId xmlns:a16="http://schemas.microsoft.com/office/drawing/2014/main" id="{31510A8E-8098-287F-C4BA-A26A060D519F}"/>
               </a:ext>
             </a:extLst>
           </p:cNvPr>
@@ -12110,8 +12286,8 @@
         </p:blipFill>
         <p:spPr>
           <a:xfrm>
-            <a:off x="2936992" y="592468"/>
-            <a:ext cx="9149642" cy="5673063"/>
+            <a:off x="1318919" y="790644"/>
+            <a:ext cx="6778977" cy="5276713"/>
           </a:xfrm>
           <a:prstGeom prst="rect">
             <a:avLst/>
@@ -12121,7 +12297,7 @@
     </p:spTree>
     <p:extLst>
       <p:ext uri="{BB962C8B-B14F-4D97-AF65-F5344CB8AC3E}">
-        <p14:creationId xmlns:p14="http://schemas.microsoft.com/office/powerpoint/2010/main" val="2550109971"/>
+        <p14:creationId xmlns:p14="http://schemas.microsoft.com/office/powerpoint/2010/main" val="228651240"/>
       </p:ext>
     </p:extLst>
   </p:cSld>
@@ -12923,6 +13099,25 @@
 </file>
 
 <file path=customXml/item1.xml><?xml version="1.0" encoding="utf-8"?>
+<p:properties xmlns:p="http://schemas.microsoft.com/office/2006/metadata/properties" xmlns:xsi="http://www.w3.org/2001/XMLSchema-instance" xmlns:pc="http://schemas.microsoft.com/office/infopath/2007/PartnerControls">
+  <documentManagement>
+    <_ip_UnifiedCompliancePolicyUIAction xmlns="http://schemas.microsoft.com/sharepoint/v3" xsi:nil="true"/>
+    <Image xmlns="71af3243-3dd4-4a8d-8c0d-dd76da1f02a5">
+      <Url xsi:nil="true"/>
+      <Description xsi:nil="true"/>
+    </Image>
+    <Status xmlns="71af3243-3dd4-4a8d-8c0d-dd76da1f02a5">Not started</Status>
+    <_ip_UnifiedCompliancePolicyProperties xmlns="http://schemas.microsoft.com/sharepoint/v3" xsi:nil="true"/>
+    <ImageTagsTaxHTField xmlns="71af3243-3dd4-4a8d-8c0d-dd76da1f02a5">
+      <Terms xmlns="http://schemas.microsoft.com/office/infopath/2007/PartnerControls"/>
+    </ImageTagsTaxHTField>
+    <TaxCatchAll xmlns="230e9df3-be65-4c73-a93b-d1236ebd677e"/>
+    <MediaServiceKeyPoints xmlns="71af3243-3dd4-4a8d-8c0d-dd76da1f02a5" xsi:nil="true"/>
+  </documentManagement>
+</p:properties>
+</file>
+
+<file path=customXml/item2.xml><?xml version="1.0" encoding="utf-8"?>
 <ct:contentTypeSchema xmlns:ct="http://schemas.microsoft.com/office/2006/metadata/contentType" xmlns:ma="http://schemas.microsoft.com/office/2006/metadata/properties/metaAttributes" ct:_="" ma:_="" ma:contentTypeName="Document" ma:contentTypeID="0x01010079F111ED35F8CC479449609E8A0923A6" ma:contentTypeVersion="20" ma:contentTypeDescription="Create a new document." ma:contentTypeScope="" ma:versionID="1267097ee5f5874adfcc408041ae252e">
   <xsd:schema xmlns:xsd="http://www.w3.org/2001/XMLSchema" xmlns:xs="http://www.w3.org/2001/XMLSchema" xmlns:p="http://schemas.microsoft.com/office/2006/metadata/properties" xmlns:ns1="http://schemas.microsoft.com/sharepoint/v3" xmlns:ns2="71af3243-3dd4-4a8d-8c0d-dd76da1f02a5" xmlns:ns3="16c05727-aa75-4e4a-9b5f-8a80a1165891" xmlns:ns4="230e9df3-be65-4c73-a93b-d1236ebd677e" targetNamespace="http://schemas.microsoft.com/office/2006/metadata/properties" ma:root="true" ma:fieldsID="395891a93df65b14727750f2c06c306c" ns1:_="" ns2:_="" ns3:_="" ns4:_="">
     <xsd:import namespace="http://schemas.microsoft.com/sharepoint/v3"/>
@@ -13198,7 +13393,7 @@
 </ct:contentTypeSchema>
 </file>
 
-<file path=customXml/item2.xml><?xml version="1.0" encoding="utf-8"?>
+<file path=customXml/item3.xml><?xml version="1.0" encoding="utf-8"?>
 <?mso-contentType ?>
 <FormTemplates xmlns="http://schemas.microsoft.com/sharepoint/v3/contenttype/forms">
   <Display>DocumentLibraryForm</Display>
@@ -13207,26 +13402,19 @@
 </FormTemplates>
 </file>
 
-<file path=customXml/item3.xml><?xml version="1.0" encoding="utf-8"?>
-<p:properties xmlns:p="http://schemas.microsoft.com/office/2006/metadata/properties" xmlns:xsi="http://www.w3.org/2001/XMLSchema-instance" xmlns:pc="http://schemas.microsoft.com/office/infopath/2007/PartnerControls">
-  <documentManagement>
-    <_ip_UnifiedCompliancePolicyUIAction xmlns="http://schemas.microsoft.com/sharepoint/v3" xsi:nil="true"/>
-    <Image xmlns="71af3243-3dd4-4a8d-8c0d-dd76da1f02a5">
-      <Url xsi:nil="true"/>
-      <Description xsi:nil="true"/>
-    </Image>
-    <Status xmlns="71af3243-3dd4-4a8d-8c0d-dd76da1f02a5">Not started</Status>
-    <_ip_UnifiedCompliancePolicyProperties xmlns="http://schemas.microsoft.com/sharepoint/v3" xsi:nil="true"/>
-    <ImageTagsTaxHTField xmlns="71af3243-3dd4-4a8d-8c0d-dd76da1f02a5">
-      <Terms xmlns="http://schemas.microsoft.com/office/infopath/2007/PartnerControls"/>
-    </ImageTagsTaxHTField>
-    <TaxCatchAll xmlns="230e9df3-be65-4c73-a93b-d1236ebd677e"/>
-    <MediaServiceKeyPoints xmlns="71af3243-3dd4-4a8d-8c0d-dd76da1f02a5" xsi:nil="true"/>
-  </documentManagement>
-</p:properties>
+<file path=customXml/itemProps1.xml><?xml version="1.0" encoding="utf-8"?>
+<ds:datastoreItem xmlns:ds="http://schemas.openxmlformats.org/officeDocument/2006/customXml" ds:itemID="{4CC7F809-A434-4A8D-A127-1C50C2DB3890}">
+  <ds:schemaRefs>
+    <ds:schemaRef ds:uri="http://schemas.microsoft.com/office/2006/metadata/properties"/>
+    <ds:schemaRef ds:uri="http://schemas.microsoft.com/office/infopath/2007/PartnerControls"/>
+    <ds:schemaRef ds:uri="http://schemas.microsoft.com/sharepoint/v3"/>
+    <ds:schemaRef ds:uri="71af3243-3dd4-4a8d-8c0d-dd76da1f02a5"/>
+    <ds:schemaRef ds:uri="230e9df3-be65-4c73-a93b-d1236ebd677e"/>
+  </ds:schemaRefs>
+</ds:datastoreItem>
 </file>
 
-<file path=customXml/itemProps1.xml><?xml version="1.0" encoding="utf-8"?>
+<file path=customXml/itemProps2.xml><?xml version="1.0" encoding="utf-8"?>
 <ds:datastoreItem xmlns:ds="http://schemas.openxmlformats.org/officeDocument/2006/customXml" ds:itemID="{4DC6F004-8F9D-4F40-8394-6C4C67F70915}">
   <ds:schemaRefs>
     <ds:schemaRef ds:uri="http://schemas.microsoft.com/office/2006/metadata/contentType"/>
@@ -13247,22 +13435,10 @@
 </ds:datastoreItem>
 </file>
 
-<file path=customXml/itemProps2.xml><?xml version="1.0" encoding="utf-8"?>
+<file path=customXml/itemProps3.xml><?xml version="1.0" encoding="utf-8"?>
 <ds:datastoreItem xmlns:ds="http://schemas.openxmlformats.org/officeDocument/2006/customXml" ds:itemID="{BD5826B4-4DD2-4A9B-8D6D-E91CF9C2316C}">
   <ds:schemaRefs>
     <ds:schemaRef ds:uri="http://schemas.microsoft.com/sharepoint/v3/contenttype/forms"/>
-  </ds:schemaRefs>
-</ds:datastoreItem>
-</file>
-
-<file path=customXml/itemProps3.xml><?xml version="1.0" encoding="utf-8"?>
-<ds:datastoreItem xmlns:ds="http://schemas.openxmlformats.org/officeDocument/2006/customXml" ds:itemID="{4CC7F809-A434-4A8D-A127-1C50C2DB3890}">
-  <ds:schemaRefs>
-    <ds:schemaRef ds:uri="http://schemas.microsoft.com/office/2006/metadata/properties"/>
-    <ds:schemaRef ds:uri="http://schemas.microsoft.com/office/infopath/2007/PartnerControls"/>
-    <ds:schemaRef ds:uri="http://schemas.microsoft.com/sharepoint/v3"/>
-    <ds:schemaRef ds:uri="71af3243-3dd4-4a8d-8c0d-dd76da1f02a5"/>
-    <ds:schemaRef ds:uri="230e9df3-be65-4c73-a93b-d1236ebd677e"/>
   </ds:schemaRefs>
 </ds:datastoreItem>
 </file>

</xml_diff>